<commit_message>
added demo flow doc and updated slim files
</commit_message>
<xml_diff>
--- a/Demo Flow.pptx
+++ b/Demo Flow.pptx
@@ -6,6 +6,7 @@
   </p:sldMasterIdLst>
   <p:sldIdLst>
     <p:sldId id="256" r:id="rId2"/>
+    <p:sldId id="257" r:id="rId3"/>
   </p:sldIdLst>
   <p:sldSz cx="9144000" cy="6858000" type="screen4x3"/>
   <p:notesSz cx="6858000" cy="9144000"/>
@@ -1132,13 +1133,9 @@
         <a:p>
           <a:r>
             <a:rPr lang="en-US" dirty="0" smtClean="0"/>
-            <a:t>Auto </a:t>
+            <a:t>Auto provision users from file</a:t>
           </a:r>
-          <a:r>
-            <a:rPr lang="en-US" smtClean="0"/>
-            <a:t>provision from file</a:t>
-          </a:r>
-          <a:endParaRPr lang="en-US"/>
+          <a:endParaRPr lang="en-US" dirty="0"/>
         </a:p>
       </dgm:t>
     </dgm:pt>
@@ -1279,6 +1276,13 @@
         </dgm:presLayoutVars>
       </dgm:prSet>
       <dgm:spPr/>
+      <dgm:t>
+        <a:bodyPr/>
+        <a:lstStyle/>
+        <a:p>
+          <a:endParaRPr lang="en-US"/>
+        </a:p>
+      </dgm:t>
     </dgm:pt>
     <dgm:pt modelId="{466A7994-BC96-9346-BA02-FD9D66EC286B}" type="pres">
       <dgm:prSet presAssocID="{D6117621-D2C5-6D4E-9CE6-BB92AD80DE80}" presName="composite" presStyleCnt="0"/>
@@ -1306,10 +1310,24 @@
     <dgm:pt modelId="{6461AFC3-3A2F-5E47-9AF9-DDBCFC2E9BB0}" type="pres">
       <dgm:prSet presAssocID="{E7A090EF-D9B0-5748-AC98-3CB6E4D99614}" presName="sibTrans" presStyleLbl="sibTrans2D1" presStyleIdx="0" presStyleCnt="2"/>
       <dgm:spPr/>
+      <dgm:t>
+        <a:bodyPr/>
+        <a:lstStyle/>
+        <a:p>
+          <a:endParaRPr lang="en-US"/>
+        </a:p>
+      </dgm:t>
     </dgm:pt>
     <dgm:pt modelId="{6B1552C8-45B1-6546-B7E1-EA92EF7E351A}" type="pres">
       <dgm:prSet presAssocID="{E7A090EF-D9B0-5748-AC98-3CB6E4D99614}" presName="connTx" presStyleLbl="sibTrans2D1" presStyleIdx="0" presStyleCnt="2"/>
       <dgm:spPr/>
+      <dgm:t>
+        <a:bodyPr/>
+        <a:lstStyle/>
+        <a:p>
+          <a:endParaRPr lang="en-US"/>
+        </a:p>
+      </dgm:t>
     </dgm:pt>
     <dgm:pt modelId="{F819660A-D6B5-1D48-8E4C-F55B6A73CC26}" type="pres">
       <dgm:prSet presAssocID="{4306F26C-B66F-FC4A-BF2F-BA7037454F8D}" presName="composite" presStyleCnt="0"/>
@@ -1337,10 +1355,24 @@
     <dgm:pt modelId="{1B019959-957C-0F4B-93C8-BE202FDD06E4}" type="pres">
       <dgm:prSet presAssocID="{149D6050-6150-D84E-AEF4-5CDA00B2BD78}" presName="sibTrans" presStyleLbl="sibTrans2D1" presStyleIdx="1" presStyleCnt="2"/>
       <dgm:spPr/>
+      <dgm:t>
+        <a:bodyPr/>
+        <a:lstStyle/>
+        <a:p>
+          <a:endParaRPr lang="en-US"/>
+        </a:p>
+      </dgm:t>
     </dgm:pt>
     <dgm:pt modelId="{4574A08F-41E8-DF48-950F-06F7A4A757C1}" type="pres">
       <dgm:prSet presAssocID="{149D6050-6150-D84E-AEF4-5CDA00B2BD78}" presName="connTx" presStyleLbl="sibTrans2D1" presStyleIdx="1" presStyleCnt="2"/>
       <dgm:spPr/>
+      <dgm:t>
+        <a:bodyPr/>
+        <a:lstStyle/>
+        <a:p>
+          <a:endParaRPr lang="en-US"/>
+        </a:p>
+      </dgm:t>
     </dgm:pt>
     <dgm:pt modelId="{F2E465B2-1F23-5445-B855-E7217D4EC7D5}" type="pres">
       <dgm:prSet presAssocID="{38A1A1BA-2A8E-1C4C-ABC4-17F9547E62FE}" presName="composite" presStyleCnt="0"/>
@@ -1371,8 +1403,8 @@
     <dgm:cxn modelId="{FF04FC2A-FABB-3D41-B234-7CF52F4B2DBF}" srcId="{D6117621-D2C5-6D4E-9CE6-BB92AD80DE80}" destId="{DDD80F30-EC23-4745-B06B-29217F6F8DC3}" srcOrd="1" destOrd="0" parTransId="{2CB0653C-A41E-D748-8972-FA14FEAFCA02}" sibTransId="{F69D7DDA-0101-5842-BCD5-F3585095D791}"/>
     <dgm:cxn modelId="{FAC58EB1-09E2-4047-9B51-668B1357009C}" type="presOf" srcId="{BC725D64-793E-D346-B8CF-8584D1E05D97}" destId="{4D86D14C-1B62-064F-A653-E4D680F56FD7}" srcOrd="0" destOrd="3" presId="urn:microsoft.com/office/officeart/2005/8/layout/hProcess10"/>
     <dgm:cxn modelId="{8FC8000F-454F-B745-8F3C-C7206C3D3176}" srcId="{BAA7B05D-E388-314A-969E-092714022D55}" destId="{D6117621-D2C5-6D4E-9CE6-BB92AD80DE80}" srcOrd="0" destOrd="0" parTransId="{090EB76D-58E0-7D49-83C7-5F31B39CAF7B}" sibTransId="{E7A090EF-D9B0-5748-AC98-3CB6E4D99614}"/>
+    <dgm:cxn modelId="{5C0799FF-B728-9A4A-BDA3-9E9CEDB1256E}" type="presOf" srcId="{E7A090EF-D9B0-5748-AC98-3CB6E4D99614}" destId="{6461AFC3-3A2F-5E47-9AF9-DDBCFC2E9BB0}" srcOrd="0" destOrd="0" presId="urn:microsoft.com/office/officeart/2005/8/layout/hProcess10"/>
     <dgm:cxn modelId="{C6165CE9-0753-3348-8739-75AB012B2F38}" type="presOf" srcId="{38A1A1BA-2A8E-1C4C-ABC4-17F9547E62FE}" destId="{137C5739-9328-2C4D-A631-3B5258ABA723}" srcOrd="0" destOrd="0" presId="urn:microsoft.com/office/officeart/2005/8/layout/hProcess10"/>
-    <dgm:cxn modelId="{5C0799FF-B728-9A4A-BDA3-9E9CEDB1256E}" type="presOf" srcId="{E7A090EF-D9B0-5748-AC98-3CB6E4D99614}" destId="{6461AFC3-3A2F-5E47-9AF9-DDBCFC2E9BB0}" srcOrd="0" destOrd="0" presId="urn:microsoft.com/office/officeart/2005/8/layout/hProcess10"/>
     <dgm:cxn modelId="{ED93FA67-1D71-7C4B-ACBD-12A84D6228F2}" srcId="{38A1A1BA-2A8E-1C4C-ABC4-17F9547E62FE}" destId="{008D5DCF-F3F7-744A-85FD-5D0CADDC8E57}" srcOrd="0" destOrd="0" parTransId="{CF7C8F6D-023D-E94B-86B3-83BD9318C342}" sibTransId="{FF050FAC-4600-8B47-A1F5-0160F0B1B69A}"/>
     <dgm:cxn modelId="{C87F64BF-05BE-A741-A3E7-23E21FE8B5BA}" type="presOf" srcId="{4D99D366-4219-5C41-882E-B0C82BDCF184}" destId="{BE64A2E3-9A98-0742-9D61-D7B2BBD3650A}" srcOrd="0" destOrd="2" presId="urn:microsoft.com/office/officeart/2005/8/layout/hProcess10"/>
     <dgm:cxn modelId="{F48F0F5F-F834-FD45-B712-D5FC02BC3584}" type="presOf" srcId="{BAA7B05D-E388-314A-969E-092714022D55}" destId="{9CB05647-85D2-F142-B645-20ABC1906C05}" srcOrd="0" destOrd="0" presId="urn:microsoft.com/office/officeart/2005/8/layout/hProcess10"/>
@@ -1383,8 +1415,8 @@
     <dgm:cxn modelId="{7C613DC1-0BD2-F849-8A87-214D6E5A321A}" srcId="{38A1A1BA-2A8E-1C4C-ABC4-17F9547E62FE}" destId="{92D236B5-F416-944E-A807-65AC5CD79DFF}" srcOrd="1" destOrd="0" parTransId="{F4E099E3-3A36-884B-9079-705729CE5A71}" sibTransId="{9BC7FA4E-04C2-D647-84F7-D2B4523ABC95}"/>
     <dgm:cxn modelId="{8B76FE38-5BA8-A749-A7DD-A19DA514E6C2}" type="presOf" srcId="{A5D9BC40-5410-A746-BA0B-3505A909B599}" destId="{BE64A2E3-9A98-0742-9D61-D7B2BBD3650A}" srcOrd="0" destOrd="1" presId="urn:microsoft.com/office/officeart/2005/8/layout/hProcess10"/>
     <dgm:cxn modelId="{7AF1A748-B6AA-6649-8788-E81AF4D5F1B7}" srcId="{BAA7B05D-E388-314A-969E-092714022D55}" destId="{38A1A1BA-2A8E-1C4C-ABC4-17F9547E62FE}" srcOrd="2" destOrd="0" parTransId="{6FDC14DC-5A66-7F48-A5CB-65A85D44964E}" sibTransId="{2D91EE81-A244-B24B-9395-8DEF04F7FD90}"/>
+    <dgm:cxn modelId="{BEFE525E-8AAF-3C4D-830A-319BFE75BC58}" type="presOf" srcId="{149D6050-6150-D84E-AEF4-5CDA00B2BD78}" destId="{1B019959-957C-0F4B-93C8-BE202FDD06E4}" srcOrd="0" destOrd="0" presId="urn:microsoft.com/office/officeart/2005/8/layout/hProcess10"/>
     <dgm:cxn modelId="{11608CE8-351A-0B4F-AA97-87D0F9B8E35A}" type="presOf" srcId="{D6117621-D2C5-6D4E-9CE6-BB92AD80DE80}" destId="{4D86D14C-1B62-064F-A653-E4D680F56FD7}" srcOrd="0" destOrd="0" presId="urn:microsoft.com/office/officeart/2005/8/layout/hProcess10"/>
-    <dgm:cxn modelId="{BEFE525E-8AAF-3C4D-830A-319BFE75BC58}" type="presOf" srcId="{149D6050-6150-D84E-AEF4-5CDA00B2BD78}" destId="{1B019959-957C-0F4B-93C8-BE202FDD06E4}" srcOrd="0" destOrd="0" presId="urn:microsoft.com/office/officeart/2005/8/layout/hProcess10"/>
     <dgm:cxn modelId="{A7D3DCBD-0A6D-0B47-819F-B3EAEF445605}" type="presOf" srcId="{E7A090EF-D9B0-5748-AC98-3CB6E4D99614}" destId="{6B1552C8-45B1-6546-B7E1-EA92EF7E351A}" srcOrd="1" destOrd="0" presId="urn:microsoft.com/office/officeart/2005/8/layout/hProcess10"/>
     <dgm:cxn modelId="{E1473A9F-D405-4346-A9F7-7EE4CEB81AD0}" srcId="{4306F26C-B66F-FC4A-BF2F-BA7037454F8D}" destId="{4D99D366-4219-5C41-882E-B0C82BDCF184}" srcOrd="1" destOrd="0" parTransId="{E793DDB0-4125-0B45-86E9-37339C473F41}" sibTransId="{FA840197-8FE8-F44A-9F3D-95E28F0BC0E2}"/>
     <dgm:cxn modelId="{0B0FFF0C-5B88-2E4F-B432-2C40C8865D0B}" type="presOf" srcId="{DDD80F30-EC23-4745-B06B-29217F6F8DC3}" destId="{4D86D14C-1B62-064F-A653-E4D680F56FD7}" srcOrd="0" destOrd="2" presId="urn:microsoft.com/office/officeart/2005/8/layout/hProcess10"/>
@@ -2167,13 +2199,9 @@
           </a:pPr>
           <a:r>
             <a:rPr lang="en-US" sz="1100" kern="1200" dirty="0" smtClean="0"/>
-            <a:t>Auto </a:t>
+            <a:t>Auto provision users from file</a:t>
           </a:r>
-          <a:r>
-            <a:rPr lang="en-US" sz="1100" kern="1200" smtClean="0"/>
-            <a:t>provision from file</a:t>
-          </a:r>
-          <a:endParaRPr lang="en-US" sz="1100" kern="1200"/>
+          <a:endParaRPr lang="en-US" sz="1100" kern="1200" dirty="0"/>
         </a:p>
         <a:p>
           <a:pPr marL="57150" lvl="1" indent="-57150" algn="l" defTabSz="488950">
@@ -3655,7 +3683,7 @@
           <a:p>
             <a:fld id="{ABB884F6-2691-FB4A-97A0-F88D3C3898E6}" type="datetimeFigureOut">
               <a:rPr lang="en-US" smtClean="0"/>
-              <a:t>4/6/16</a:t>
+              <a:t>4/7/16</a:t>
             </a:fld>
             <a:endParaRPr lang="en-US"/>
           </a:p>
@@ -3825,7 +3853,7 @@
           <a:p>
             <a:fld id="{ABB884F6-2691-FB4A-97A0-F88D3C3898E6}" type="datetimeFigureOut">
               <a:rPr lang="en-US" smtClean="0"/>
-              <a:t>4/6/16</a:t>
+              <a:t>4/7/16</a:t>
             </a:fld>
             <a:endParaRPr lang="en-US"/>
           </a:p>
@@ -4005,7 +4033,7 @@
           <a:p>
             <a:fld id="{ABB884F6-2691-FB4A-97A0-F88D3C3898E6}" type="datetimeFigureOut">
               <a:rPr lang="en-US" smtClean="0"/>
-              <a:t>4/6/16</a:t>
+              <a:t>4/7/16</a:t>
             </a:fld>
             <a:endParaRPr lang="en-US"/>
           </a:p>
@@ -4175,7 +4203,7 @@
           <a:p>
             <a:fld id="{ABB884F6-2691-FB4A-97A0-F88D3C3898E6}" type="datetimeFigureOut">
               <a:rPr lang="en-US" smtClean="0"/>
-              <a:t>4/6/16</a:t>
+              <a:t>4/7/16</a:t>
             </a:fld>
             <a:endParaRPr lang="en-US"/>
           </a:p>
@@ -4421,7 +4449,7 @@
           <a:p>
             <a:fld id="{ABB884F6-2691-FB4A-97A0-F88D3C3898E6}" type="datetimeFigureOut">
               <a:rPr lang="en-US" smtClean="0"/>
-              <a:t>4/6/16</a:t>
+              <a:t>4/7/16</a:t>
             </a:fld>
             <a:endParaRPr lang="en-US"/>
           </a:p>
@@ -4709,7 +4737,7 @@
           <a:p>
             <a:fld id="{ABB884F6-2691-FB4A-97A0-F88D3C3898E6}" type="datetimeFigureOut">
               <a:rPr lang="en-US" smtClean="0"/>
-              <a:t>4/6/16</a:t>
+              <a:t>4/7/16</a:t>
             </a:fld>
             <a:endParaRPr lang="en-US"/>
           </a:p>
@@ -5131,7 +5159,7 @@
           <a:p>
             <a:fld id="{ABB884F6-2691-FB4A-97A0-F88D3C3898E6}" type="datetimeFigureOut">
               <a:rPr lang="en-US" smtClean="0"/>
-              <a:t>4/6/16</a:t>
+              <a:t>4/7/16</a:t>
             </a:fld>
             <a:endParaRPr lang="en-US"/>
           </a:p>
@@ -5249,7 +5277,7 @@
           <a:p>
             <a:fld id="{ABB884F6-2691-FB4A-97A0-F88D3C3898E6}" type="datetimeFigureOut">
               <a:rPr lang="en-US" smtClean="0"/>
-              <a:t>4/6/16</a:t>
+              <a:t>4/7/16</a:t>
             </a:fld>
             <a:endParaRPr lang="en-US"/>
           </a:p>
@@ -5344,7 +5372,7 @@
           <a:p>
             <a:fld id="{ABB884F6-2691-FB4A-97A0-F88D3C3898E6}" type="datetimeFigureOut">
               <a:rPr lang="en-US" smtClean="0"/>
-              <a:t>4/6/16</a:t>
+              <a:t>4/7/16</a:t>
             </a:fld>
             <a:endParaRPr lang="en-US"/>
           </a:p>
@@ -5621,7 +5649,7 @@
           <a:p>
             <a:fld id="{ABB884F6-2691-FB4A-97A0-F88D3C3898E6}" type="datetimeFigureOut">
               <a:rPr lang="en-US" smtClean="0"/>
-              <a:t>4/6/16</a:t>
+              <a:t>4/7/16</a:t>
             </a:fld>
             <a:endParaRPr lang="en-US"/>
           </a:p>
@@ -5874,7 +5902,7 @@
           <a:p>
             <a:fld id="{ABB884F6-2691-FB4A-97A0-F88D3C3898E6}" type="datetimeFigureOut">
               <a:rPr lang="en-US" smtClean="0"/>
-              <a:t>4/6/16</a:t>
+              <a:t>4/7/16</a:t>
             </a:fld>
             <a:endParaRPr lang="en-US"/>
           </a:p>
@@ -6087,7 +6115,7 @@
           <a:p>
             <a:fld id="{ABB884F6-2691-FB4A-97A0-F88D3C3898E6}" type="datetimeFigureOut">
               <a:rPr lang="en-US" smtClean="0"/>
-              <a:t>4/6/16</a:t>
+              <a:t>4/7/16</a:t>
             </a:fld>
             <a:endParaRPr lang="en-US"/>
           </a:p>
@@ -6479,14 +6507,16 @@
           </a:xfrm>
         </p:spPr>
         <p:txBody>
-          <a:bodyPr/>
+          <a:bodyPr>
+            <a:normAutofit/>
+          </a:bodyPr>
           <a:lstStyle/>
           <a:p>
             <a:r>
-              <a:rPr lang="en-US" dirty="0" smtClean="0"/>
-              <a:t>Lifecycle Management</a:t>
+              <a:rPr lang="en-US" sz="3200" dirty="0" smtClean="0"/>
+              <a:t>Lifecycle Management Demo Flow</a:t>
             </a:r>
-            <a:endParaRPr lang="en-US" dirty="0"/>
+            <a:endParaRPr lang="en-US" sz="3200" dirty="0"/>
           </a:p>
         </p:txBody>
       </p:sp>
@@ -6497,7 +6527,7 @@
           <p:nvPr>
             <p:extLst>
               <p:ext uri="{D42A27DB-BD31-4B8C-83A1-F6EECF244321}">
-                <p14:modId xmlns:p14="http://schemas.microsoft.com/office/powerpoint/2010/main" val="1760750704"/>
+                <p14:modId xmlns:p14="http://schemas.microsoft.com/office/powerpoint/2010/main" val="909419724"/>
               </p:ext>
             </p:extLst>
           </p:nvPr>
@@ -6542,13 +6572,13 @@
           <a:p>
             <a:r>
               <a:rPr lang="en-US" sz="1400" dirty="0" smtClean="0"/>
-              <a:t>Populate twitter data</a:t>
+              <a:t>*Populate twitter data</a:t>
             </a:r>
           </a:p>
           <a:p>
             <a:r>
               <a:rPr lang="en-US" sz="1400" dirty="0" smtClean="0"/>
-              <a:t>Customize look and feel (logos, etc.)</a:t>
+              <a:t>*Customize look and feel (logos, etc.)</a:t>
             </a:r>
           </a:p>
         </p:txBody>
@@ -6570,6 +6600,107 @@
       </p:par>
     </p:tnLst>
   </p:timing>
+</p:sld>
+</file>
+
+<file path=ppt/slides/slide2.xml><?xml version="1.0" encoding="utf-8"?>
+<p:sld xmlns:a="http://schemas.openxmlformats.org/drawingml/2006/main" xmlns:r="http://schemas.openxmlformats.org/officeDocument/2006/relationships" xmlns:p="http://schemas.openxmlformats.org/presentationml/2006/main">
+  <p:cSld>
+    <p:spTree>
+      <p:nvGrpSpPr>
+        <p:cNvPr id="1" name=""/>
+        <p:cNvGrpSpPr/>
+        <p:nvPr/>
+      </p:nvGrpSpPr>
+      <p:grpSpPr>
+        <a:xfrm>
+          <a:off x="0" y="0"/>
+          <a:ext cx="0" cy="0"/>
+          <a:chOff x="0" y="0"/>
+          <a:chExt cx="0" cy="0"/>
+        </a:xfrm>
+      </p:grpSpPr>
+      <p:sp>
+        <p:nvSpPr>
+          <p:cNvPr id="2" name="Title 1"/>
+          <p:cNvSpPr>
+            <a:spLocks noGrp="1"/>
+          </p:cNvSpPr>
+          <p:nvPr>
+            <p:ph type="title"/>
+          </p:nvPr>
+        </p:nvSpPr>
+        <p:spPr>
+          <a:xfrm>
+            <a:off x="457200" y="274638"/>
+            <a:ext cx="8229600" cy="529695"/>
+          </a:xfrm>
+        </p:spPr>
+        <p:txBody>
+          <a:bodyPr>
+            <a:normAutofit/>
+          </a:bodyPr>
+          <a:lstStyle/>
+          <a:p>
+            <a:r>
+              <a:rPr lang="en-US" sz="2800" dirty="0" smtClean="0"/>
+              <a:t>To Do</a:t>
+            </a:r>
+            <a:endParaRPr lang="en-US" sz="2800" dirty="0"/>
+          </a:p>
+        </p:txBody>
+      </p:sp>
+      <p:sp>
+        <p:nvSpPr>
+          <p:cNvPr id="3" name="Content Placeholder 2"/>
+          <p:cNvSpPr>
+            <a:spLocks noGrp="1"/>
+          </p:cNvSpPr>
+          <p:nvPr>
+            <p:ph idx="1"/>
+          </p:nvPr>
+        </p:nvSpPr>
+        <p:spPr>
+          <a:xfrm>
+            <a:off x="457200" y="1063978"/>
+            <a:ext cx="8229600" cy="4525963"/>
+          </a:xfrm>
+        </p:spPr>
+        <p:txBody>
+          <a:bodyPr>
+            <a:normAutofit/>
+          </a:bodyPr>
+          <a:lstStyle/>
+          <a:p>
+            <a:r>
+              <a:rPr lang="en-US" sz="2400" dirty="0" smtClean="0"/>
+              <a:t>Create a new organization (w admin) for demos without many test projects</a:t>
+            </a:r>
+          </a:p>
+          <a:p>
+            <a:r>
+              <a:rPr lang="en-US" sz="2400" dirty="0" smtClean="0"/>
+              <a:t>Build retail analytics-like project with data and dashboard content on the new machine</a:t>
+            </a:r>
+          </a:p>
+          <a:p>
+            <a:pPr marL="0" indent="0">
+              <a:buNone/>
+            </a:pPr>
+            <a:endParaRPr lang="en-US" sz="2400" dirty="0"/>
+          </a:p>
+        </p:txBody>
+      </p:sp>
+    </p:spTree>
+    <p:extLst>
+      <p:ext uri="{BB962C8B-B14F-4D97-AF65-F5344CB8AC3E}">
+        <p14:creationId xmlns:p14="http://schemas.microsoft.com/office/powerpoint/2010/main" val="3828114752"/>
+      </p:ext>
+    </p:extLst>
+  </p:cSld>
+  <p:clrMapOvr>
+    <a:masterClrMapping/>
+  </p:clrMapOvr>
 </p:sld>
 </file>
 

</xml_diff>